<commit_message>
Updated schedule to reflect rolling in FHIR validation into parsers
</commit_message>
<xml_diff>
--- a/collateral/Team 55 Sprint 4.pptx
+++ b/collateral/Team 55 Sprint 4.pptx
@@ -6,7 +6,7 @@
     <p:sldMasterId id="2147483680" r:id="rId2"/>
   </p:sldMasterIdLst>
   <p:notesMasterIdLst>
-    <p:notesMasterId r:id="rId14"/>
+    <p:notesMasterId r:id="rId15"/>
   </p:notesMasterIdLst>
   <p:sldIdLst>
     <p:sldId id="265" r:id="rId3"/>
@@ -18,8 +18,9 @@
     <p:sldId id="274" r:id="rId9"/>
     <p:sldId id="263" r:id="rId10"/>
     <p:sldId id="276" r:id="rId11"/>
-    <p:sldId id="270" r:id="rId12"/>
-    <p:sldId id="277" r:id="rId13"/>
+    <p:sldId id="278" r:id="rId12"/>
+    <p:sldId id="270" r:id="rId13"/>
+    <p:sldId id="277" r:id="rId14"/>
   </p:sldIdLst>
   <p:sldSz cx="9144000" cy="6858000" type="screen4x3"/>
   <p:notesSz cx="6858000" cy="9144000"/>
@@ -570,6 +571,90 @@
 </p:notes>
 </file>
 
+<file path=ppt/notesSlides/notesSlide10.xml><?xml version="1.0" encoding="utf-8"?>
+<p:notes xmlns:a="http://schemas.openxmlformats.org/drawingml/2006/main" xmlns:r="http://schemas.openxmlformats.org/officeDocument/2006/relationships" xmlns:p="http://schemas.openxmlformats.org/presentationml/2006/main">
+  <p:cSld>
+    <p:spTree>
+      <p:nvGrpSpPr>
+        <p:cNvPr id="1" name=""/>
+        <p:cNvGrpSpPr/>
+        <p:nvPr/>
+      </p:nvGrpSpPr>
+      <p:grpSpPr>
+        <a:xfrm>
+          <a:off x="0" y="0"/>
+          <a:ext cx="0" cy="0"/>
+          <a:chOff x="0" y="0"/>
+          <a:chExt cx="0" cy="0"/>
+        </a:xfrm>
+      </p:grpSpPr>
+      <p:sp>
+        <p:nvSpPr>
+          <p:cNvPr id="2" name="Slide Image Placeholder 1"/>
+          <p:cNvSpPr>
+            <a:spLocks noGrp="1" noRot="1" noChangeAspect="1"/>
+          </p:cNvSpPr>
+          <p:nvPr>
+            <p:ph type="sldImg"/>
+          </p:nvPr>
+        </p:nvSpPr>
+        <p:spPr/>
+      </p:sp>
+      <p:sp>
+        <p:nvSpPr>
+          <p:cNvPr id="3" name="Notes Placeholder 2"/>
+          <p:cNvSpPr>
+            <a:spLocks noGrp="1"/>
+          </p:cNvSpPr>
+          <p:nvPr>
+            <p:ph type="body" idx="1"/>
+          </p:nvPr>
+        </p:nvSpPr>
+        <p:spPr/>
+        <p:txBody>
+          <a:bodyPr/>
+          <a:lstStyle/>
+          <a:p>
+            <a:endParaRPr lang="en-US" dirty="0"/>
+          </a:p>
+        </p:txBody>
+      </p:sp>
+      <p:sp>
+        <p:nvSpPr>
+          <p:cNvPr id="4" name="Slide Number Placeholder 3"/>
+          <p:cNvSpPr>
+            <a:spLocks noGrp="1"/>
+          </p:cNvSpPr>
+          <p:nvPr>
+            <p:ph type="sldNum" sz="quarter" idx="5"/>
+          </p:nvPr>
+        </p:nvSpPr>
+        <p:spPr/>
+        <p:txBody>
+          <a:bodyPr/>
+          <a:lstStyle/>
+          <a:p>
+            <a:fld id="{58C53205-88F7-494A-B204-E8144581CAEF}" type="slidenum">
+              <a:rPr lang="en-US" smtClean="0"/>
+              <a:t>12</a:t>
+            </a:fld>
+            <a:endParaRPr lang="en-US"/>
+          </a:p>
+        </p:txBody>
+      </p:sp>
+    </p:spTree>
+    <p:extLst>
+      <p:ext uri="{BB962C8B-B14F-4D97-AF65-F5344CB8AC3E}">
+        <p14:creationId xmlns:p14="http://schemas.microsoft.com/office/powerpoint/2010/main" val="3427032822"/>
+      </p:ext>
+    </p:extLst>
+  </p:cSld>
+  <p:clrMapOvr>
+    <a:masterClrMapping/>
+  </p:clrMapOvr>
+</p:notes>
+</file>
+
 <file path=ppt/notesSlides/notesSlide2.xml><?xml version="1.0" encoding="utf-8"?>
 <p:notes xmlns:a="http://schemas.openxmlformats.org/drawingml/2006/main" xmlns:r="http://schemas.openxmlformats.org/officeDocument/2006/relationships" xmlns:p="http://schemas.openxmlformats.org/presentationml/2006/main">
   <p:cSld>
@@ -1186,7 +1271,7 @@
     </p:spTree>
     <p:extLst>
       <p:ext uri="{BB962C8B-B14F-4D97-AF65-F5344CB8AC3E}">
-        <p14:creationId xmlns:p14="http://schemas.microsoft.com/office/powerpoint/2010/main" val="2287712303"/>
+        <p14:creationId xmlns:p14="http://schemas.microsoft.com/office/powerpoint/2010/main" val="264047500"/>
       </p:ext>
     </p:extLst>
   </p:cSld>
@@ -1270,7 +1355,7 @@
     </p:spTree>
     <p:extLst>
       <p:ext uri="{BB962C8B-B14F-4D97-AF65-F5344CB8AC3E}">
-        <p14:creationId xmlns:p14="http://schemas.microsoft.com/office/powerpoint/2010/main" val="3427032822"/>
+        <p14:creationId xmlns:p14="http://schemas.microsoft.com/office/powerpoint/2010/main" val="2287712303"/>
       </p:ext>
     </p:extLst>
   </p:cSld>
@@ -4954,6 +5039,53 @@
       </p:grpSpPr>
       <p:sp>
         <p:nvSpPr>
+          <p:cNvPr id="6" name="Date Placeholder 5"/>
+          <p:cNvSpPr>
+            <a:spLocks noGrp="1"/>
+          </p:cNvSpPr>
+          <p:nvPr>
+            <p:ph type="dt" sz="half" idx="10"/>
+          </p:nvPr>
+        </p:nvSpPr>
+        <p:spPr/>
+        <p:txBody>
+          <a:bodyPr/>
+          <a:lstStyle/>
+          <a:p>
+            <a:r>
+              <a:rPr lang="en-US"/>
+              <a:t>10/17/2020</a:t>
+            </a:r>
+            <a:endParaRPr lang="en-US" dirty="0"/>
+          </a:p>
+        </p:txBody>
+      </p:sp>
+      <p:sp>
+        <p:nvSpPr>
+          <p:cNvPr id="5" name="Slide Number Placeholder 4"/>
+          <p:cNvSpPr>
+            <a:spLocks noGrp="1"/>
+          </p:cNvSpPr>
+          <p:nvPr>
+            <p:ph type="sldNum" sz="quarter" idx="12"/>
+          </p:nvPr>
+        </p:nvSpPr>
+        <p:spPr/>
+        <p:txBody>
+          <a:bodyPr/>
+          <a:lstStyle/>
+          <a:p>
+            <a:fld id="{079BB85F-8D7B-4121-93BF-56CC81854BC2}" type="slidenum">
+              <a:rPr lang="en-US" smtClean="0"/>
+              <a:pPr/>
+              <a:t>10</a:t>
+            </a:fld>
+            <a:endParaRPr lang="en-US" dirty="0"/>
+          </a:p>
+        </p:txBody>
+      </p:sp>
+      <p:sp>
+        <p:nvSpPr>
           <p:cNvPr id="2" name="Title 1"/>
           <p:cNvSpPr>
             <a:spLocks noGrp="1"/>
@@ -4970,19 +5102,18 @@
           <a:lstStyle/>
           <a:p>
             <a:r>
-              <a:rPr lang="en-US"/>
-              <a:t>Project Plan Update</a:t>
-            </a:r>
-            <a:endParaRPr lang="en-US" dirty="0"/>
-          </a:p>
-        </p:txBody>
-      </p:sp>
-      <p:sp>
-        <p:nvSpPr>
-          <p:cNvPr id="10" name="Date Placeholder 5">
+              <a:rPr lang="en-US" dirty="0"/>
+              <a:t>QA Screenshot</a:t>
+            </a:r>
+          </a:p>
+        </p:txBody>
+      </p:sp>
+      <p:sp>
+        <p:nvSpPr>
+          <p:cNvPr id="4" name="Content Placeholder 3">
             <a:extLst>
               <a:ext uri="{FF2B5EF4-FFF2-40B4-BE49-F238E27FC236}">
-                <a16:creationId xmlns:a16="http://schemas.microsoft.com/office/drawing/2014/main" id="{D5C8633F-2DB9-7846-9636-7DEB43697DF4}"/>
+                <a16:creationId xmlns:a16="http://schemas.microsoft.com/office/drawing/2014/main" id="{DEAEFAA2-6890-D242-86D7-2439F14FF843}"/>
               </a:ext>
             </a:extLst>
           </p:cNvPr>
@@ -4990,60 +5121,78 @@
             <a:spLocks noGrp="1"/>
           </p:cNvSpPr>
           <p:nvPr>
-            <p:ph type="dt" sz="half" idx="10"/>
-          </p:nvPr>
-        </p:nvSpPr>
-        <p:spPr>
-          <a:xfrm>
-            <a:off x="285750" y="5811838"/>
-            <a:ext cx="2057400" cy="365125"/>
-          </a:xfrm>
-        </p:spPr>
-        <p:txBody>
-          <a:bodyPr/>
-          <a:lstStyle/>
-          <a:p>
-            <a:r>
-              <a:rPr lang="en-US" dirty="0"/>
-              <a:t>10/17/2020</a:t>
+            <p:ph idx="1"/>
+          </p:nvPr>
+        </p:nvSpPr>
+        <p:spPr/>
+        <p:txBody>
+          <a:bodyPr/>
+          <a:lstStyle/>
+          <a:p>
+            <a:r>
+              <a:rPr lang="en-US" dirty="0"/>
+              <a:t>Docker container on left, </a:t>
+            </a:r>
+            <a:r>
+              <a:rPr lang="en-US" dirty="0" err="1"/>
+              <a:t>DBeaver</a:t>
+            </a:r>
+            <a:r>
+              <a:rPr lang="en-US" dirty="0"/>
+              <a:t> GUI on right</a:t>
             </a:r>
           </a:p>
         </p:txBody>
       </p:sp>
       <p:pic>
         <p:nvPicPr>
-          <p:cNvPr id="3" name="Picture 2">
+          <p:cNvPr id="1026" name="Picture 2">
             <a:extLst>
               <a:ext uri="{FF2B5EF4-FFF2-40B4-BE49-F238E27FC236}">
-                <a16:creationId xmlns:a16="http://schemas.microsoft.com/office/drawing/2014/main" id="{922958BB-550D-5844-BCE8-B5AAD6CACC7D}"/>
+                <a16:creationId xmlns:a16="http://schemas.microsoft.com/office/drawing/2014/main" id="{35EEBF7C-36D0-FA46-84D4-0244AFB1216D}"/>
               </a:ext>
             </a:extLst>
           </p:cNvPr>
           <p:cNvPicPr>
-            <a:picLocks noChangeAspect="1"/>
+            <a:picLocks noChangeAspect="1" noChangeArrowheads="1"/>
           </p:cNvPicPr>
           <p:nvPr/>
         </p:nvPicPr>
-        <p:blipFill>
-          <a:blip r:embed="rId3"/>
-          <a:stretch>
-            <a:fillRect/>
-          </a:stretch>
+        <p:blipFill rotWithShape="1">
+          <a:blip r:embed="rId3">
+            <a:extLst>
+              <a:ext uri="{28A0092B-C50C-407E-A947-70E740481C1C}">
+                <a14:useLocalDpi xmlns:a14="http://schemas.microsoft.com/office/drawing/2010/main" val="0"/>
+              </a:ext>
+            </a:extLst>
+          </a:blip>
+          <a:srcRect r="26667"/>
+          <a:stretch/>
         </p:blipFill>
-        <p:spPr>
+        <p:spPr bwMode="auto">
           <a:xfrm>
-            <a:off x="381000" y="1143000"/>
-            <a:ext cx="8382000" cy="4476128"/>
+            <a:off x="457200" y="2057400"/>
+            <a:ext cx="8237913" cy="3847869"/>
           </a:xfrm>
           <a:prstGeom prst="rect">
             <a:avLst/>
           </a:prstGeom>
+          <a:noFill/>
+          <a:extLst>
+            <a:ext uri="{909E8E84-426E-40DD-AFC4-6F175D3DCCD1}">
+              <a14:hiddenFill xmlns:a14="http://schemas.microsoft.com/office/drawing/2010/main">
+                <a:solidFill>
+                  <a:srgbClr val="FFFFFF"/>
+                </a:solidFill>
+              </a14:hiddenFill>
+            </a:ext>
+          </a:extLst>
         </p:spPr>
       </p:pic>
     </p:spTree>
     <p:extLst>
       <p:ext uri="{BB962C8B-B14F-4D97-AF65-F5344CB8AC3E}">
-        <p14:creationId xmlns:p14="http://schemas.microsoft.com/office/powerpoint/2010/main" val="1057713199"/>
+        <p14:creationId xmlns:p14="http://schemas.microsoft.com/office/powerpoint/2010/main" val="957742315"/>
       </p:ext>
     </p:extLst>
   </p:cSld>
@@ -5072,6 +5221,124 @@
       </p:grpSpPr>
       <p:sp>
         <p:nvSpPr>
+          <p:cNvPr id="2" name="Title 1"/>
+          <p:cNvSpPr>
+            <a:spLocks noGrp="1"/>
+          </p:cNvSpPr>
+          <p:nvPr>
+            <p:ph type="title"/>
+          </p:nvPr>
+        </p:nvSpPr>
+        <p:spPr/>
+        <p:txBody>
+          <a:bodyPr>
+            <a:normAutofit/>
+          </a:bodyPr>
+          <a:lstStyle/>
+          <a:p>
+            <a:r>
+              <a:rPr lang="en-US"/>
+              <a:t>Project Plan Update</a:t>
+            </a:r>
+            <a:endParaRPr lang="en-US" dirty="0"/>
+          </a:p>
+        </p:txBody>
+      </p:sp>
+      <p:sp>
+        <p:nvSpPr>
+          <p:cNvPr id="10" name="Date Placeholder 5">
+            <a:extLst>
+              <a:ext uri="{FF2B5EF4-FFF2-40B4-BE49-F238E27FC236}">
+                <a16:creationId xmlns:a16="http://schemas.microsoft.com/office/drawing/2014/main" id="{D5C8633F-2DB9-7846-9636-7DEB43697DF4}"/>
+              </a:ext>
+            </a:extLst>
+          </p:cNvPr>
+          <p:cNvSpPr>
+            <a:spLocks noGrp="1"/>
+          </p:cNvSpPr>
+          <p:nvPr>
+            <p:ph type="dt" sz="half" idx="10"/>
+          </p:nvPr>
+        </p:nvSpPr>
+        <p:spPr>
+          <a:xfrm>
+            <a:off x="285750" y="5811838"/>
+            <a:ext cx="2057400" cy="365125"/>
+          </a:xfrm>
+        </p:spPr>
+        <p:txBody>
+          <a:bodyPr/>
+          <a:lstStyle/>
+          <a:p>
+            <a:r>
+              <a:rPr lang="en-US" dirty="0"/>
+              <a:t>10/17/2020</a:t>
+            </a:r>
+          </a:p>
+        </p:txBody>
+      </p:sp>
+      <p:pic>
+        <p:nvPicPr>
+          <p:cNvPr id="4" name="Picture 3">
+            <a:extLst>
+              <a:ext uri="{FF2B5EF4-FFF2-40B4-BE49-F238E27FC236}">
+                <a16:creationId xmlns:a16="http://schemas.microsoft.com/office/drawing/2014/main" id="{E8FDECED-66B0-6D48-AB61-3642C1F12FD3}"/>
+              </a:ext>
+            </a:extLst>
+          </p:cNvPr>
+          <p:cNvPicPr>
+            <a:picLocks noChangeAspect="1"/>
+          </p:cNvPicPr>
+          <p:nvPr/>
+        </p:nvPicPr>
+        <p:blipFill>
+          <a:blip r:embed="rId3"/>
+          <a:stretch>
+            <a:fillRect/>
+          </a:stretch>
+        </p:blipFill>
+        <p:spPr>
+          <a:xfrm>
+            <a:off x="246462" y="1295400"/>
+            <a:ext cx="8745138" cy="4311443"/>
+          </a:xfrm>
+          <a:prstGeom prst="rect">
+            <a:avLst/>
+          </a:prstGeom>
+        </p:spPr>
+      </p:pic>
+    </p:spTree>
+    <p:extLst>
+      <p:ext uri="{BB962C8B-B14F-4D97-AF65-F5344CB8AC3E}">
+        <p14:creationId xmlns:p14="http://schemas.microsoft.com/office/powerpoint/2010/main" val="1057713199"/>
+      </p:ext>
+    </p:extLst>
+  </p:cSld>
+  <p:clrMapOvr>
+    <a:masterClrMapping/>
+  </p:clrMapOvr>
+</p:sld>
+</file>
+
+<file path=ppt/slides/slide12.xml><?xml version="1.0" encoding="utf-8"?>
+<p:sld xmlns:a="http://schemas.openxmlformats.org/drawingml/2006/main" xmlns:r="http://schemas.openxmlformats.org/officeDocument/2006/relationships" xmlns:p="http://schemas.openxmlformats.org/presentationml/2006/main">
+  <p:cSld>
+    <p:spTree>
+      <p:nvGrpSpPr>
+        <p:cNvPr id="1" name=""/>
+        <p:cNvGrpSpPr/>
+        <p:nvPr/>
+      </p:nvGrpSpPr>
+      <p:grpSpPr>
+        <a:xfrm>
+          <a:off x="0" y="0"/>
+          <a:ext cx="0" cy="0"/>
+          <a:chOff x="0" y="0"/>
+          <a:chExt cx="0" cy="0"/>
+        </a:xfrm>
+      </p:grpSpPr>
+      <p:sp>
+        <p:nvSpPr>
           <p:cNvPr id="6" name="Date Placeholder 5"/>
           <p:cNvSpPr>
             <a:spLocks noGrp="1"/>
@@ -5110,7 +5377,7 @@
             <a:fld id="{079BB85F-8D7B-4121-93BF-56CC81854BC2}" type="slidenum">
               <a:rPr lang="en-US" smtClean="0"/>
               <a:pPr/>
-              <a:t>11</a:t>
+              <a:t>12</a:t>
             </a:fld>
             <a:endParaRPr lang="en-US" dirty="0"/>
           </a:p>
@@ -5168,13 +5435,7 @@
           <a:p>
             <a:r>
               <a:rPr lang="en-US" dirty="0"/>
-              <a:t>TBD</a:t>
-            </a:r>
-          </a:p>
-          <a:p>
-            <a:r>
-              <a:rPr lang="en-US" dirty="0"/>
-              <a:t>FHIR server validation code to be rolled out</a:t>
+              <a:t>Update JSON parser code to use requests lib</a:t>
             </a:r>
           </a:p>
           <a:p>
@@ -5414,55 +5675,6 @@
                       </p:childTnLst>
                     </p:cTn>
                   </p:par>
-                  <p:par>
-                    <p:cTn id="19" fill="hold">
-                      <p:stCondLst>
-                        <p:cond delay="indefinite"/>
-                      </p:stCondLst>
-                      <p:childTnLst>
-                        <p:par>
-                          <p:cTn id="20" fill="hold">
-                            <p:stCondLst>
-                              <p:cond delay="0"/>
-                            </p:stCondLst>
-                            <p:childTnLst>
-                              <p:par>
-                                <p:cTn id="21" presetID="1" presetClass="entr" presetSubtype="0" fill="hold" grpId="0" nodeType="clickEffect">
-                                  <p:stCondLst>
-                                    <p:cond delay="0"/>
-                                  </p:stCondLst>
-                                  <p:childTnLst>
-                                    <p:set>
-                                      <p:cBhvr>
-                                        <p:cTn id="22" dur="1" fill="hold">
-                                          <p:stCondLst>
-                                            <p:cond delay="0"/>
-                                          </p:stCondLst>
-                                        </p:cTn>
-                                        <p:tgtEl>
-                                          <p:spTgt spid="8">
-                                            <p:txEl>
-                                              <p:pRg st="4" end="4"/>
-                                            </p:txEl>
-                                          </p:spTgt>
-                                        </p:tgtEl>
-                                        <p:attrNameLst>
-                                          <p:attrName>style.visibility</p:attrName>
-                                        </p:attrNameLst>
-                                      </p:cBhvr>
-                                      <p:to>
-                                        <p:strVal val="visible"/>
-                                      </p:to>
-                                    </p:set>
-                                  </p:childTnLst>
-                                </p:cTn>
-                              </p:par>
-                            </p:childTnLst>
-                          </p:cTn>
-                        </p:par>
-                      </p:childTnLst>
-                    </p:cTn>
-                  </p:par>
                 </p:childTnLst>
               </p:cTn>
               <p:prevCondLst>
@@ -6032,60 +6244,41 @@
         </p:spPr>
         <p:txBody>
           <a:bodyPr>
-            <a:normAutofit lnSpcReduction="10000"/>
+            <a:normAutofit/>
           </a:bodyPr>
           <a:lstStyle/>
           <a:p>
             <a:r>
               <a:rPr lang="en-US" dirty="0"/>
-              <a:t>No major changes here</a:t>
-            </a:r>
-          </a:p>
-          <a:p>
-            <a:r>
-              <a:rPr lang="en-US" dirty="0"/>
-              <a:t>Confirmed with mentor that:</a:t>
+              <a:t>Decided to move conversion of JSON/XML to common format to after the FHIR server response</a:t>
             </a:r>
           </a:p>
           <a:p>
             <a:pPr lvl="1"/>
             <a:r>
               <a:rPr lang="en-US" dirty="0"/>
-              <a:t>We will use public FHIR server for validation</a:t>
+              <a:t>Old: Convert XML to JSON and then POST JSON only</a:t>
             </a:r>
           </a:p>
           <a:p>
             <a:pPr lvl="1"/>
             <a:r>
               <a:rPr lang="en-US" dirty="0"/>
-              <a:t>We will use a local DB</a:t>
-            </a:r>
-          </a:p>
-          <a:p>
-            <a:pPr lvl="1"/>
-            <a:r>
-              <a:rPr lang="en-US" dirty="0"/>
-              <a:t>Expected use model is a script that takes an input file of JSON/XML resources</a:t>
-            </a:r>
-          </a:p>
-          <a:p>
-            <a:r>
-              <a:rPr lang="en-US" dirty="0"/>
-              <a:t>Only potential changes as time permits are:</a:t>
-            </a:r>
-          </a:p>
-          <a:p>
-            <a:pPr lvl="1"/>
-            <a:r>
-              <a:rPr lang="en-US" dirty="0"/>
-              <a:t>Extension to existing DB to include more tables</a:t>
-            </a:r>
-          </a:p>
-          <a:p>
-            <a:pPr lvl="1"/>
-            <a:r>
-              <a:rPr lang="en-US" dirty="0"/>
-              <a:t>Supporting more FHIR resource types</a:t>
+              <a:t>New: Post XML/JSON directly, convert response to Python dictionary</a:t>
+            </a:r>
+          </a:p>
+          <a:p>
+            <a:r>
+              <a:rPr lang="en-US" dirty="0"/>
+              <a:t>As a result, will no longer use the </a:t>
+            </a:r>
+            <a:r>
+              <a:rPr lang="en-US" dirty="0" err="1"/>
+              <a:t>fhirclient.py</a:t>
+            </a:r>
+            <a:r>
+              <a:rPr lang="en-US" dirty="0"/>
+              <a:t> library and roll in the FHIR validation code into the JSON/XML handling</a:t>
             </a:r>
           </a:p>
         </p:txBody>
@@ -6094,6 +6287,357 @@
     <p:extLst>
       <p:ext uri="{BB962C8B-B14F-4D97-AF65-F5344CB8AC3E}">
         <p14:creationId xmlns:p14="http://schemas.microsoft.com/office/powerpoint/2010/main" val="754537252"/>
+      </p:ext>
+    </p:extLst>
+  </p:cSld>
+  <p:clrMapOvr>
+    <a:masterClrMapping/>
+  </p:clrMapOvr>
+  <p:timing>
+    <p:tnLst>
+      <p:par>
+        <p:cTn id="1" dur="indefinite" restart="never" nodeType="tmRoot">
+          <p:childTnLst>
+            <p:seq concurrent="1" nextAc="seek">
+              <p:cTn id="2" dur="indefinite" nodeType="mainSeq">
+                <p:childTnLst>
+                  <p:par>
+                    <p:cTn id="3" fill="hold">
+                      <p:stCondLst>
+                        <p:cond delay="indefinite"/>
+                      </p:stCondLst>
+                      <p:childTnLst>
+                        <p:par>
+                          <p:cTn id="4" fill="hold">
+                            <p:stCondLst>
+                              <p:cond delay="0"/>
+                            </p:stCondLst>
+                            <p:childTnLst>
+                              <p:par>
+                                <p:cTn id="5" presetID="1" presetClass="entr" presetSubtype="0" fill="hold" grpId="0" nodeType="clickEffect">
+                                  <p:stCondLst>
+                                    <p:cond delay="0"/>
+                                  </p:stCondLst>
+                                  <p:childTnLst>
+                                    <p:set>
+                                      <p:cBhvr>
+                                        <p:cTn id="6" dur="1" fill="hold">
+                                          <p:stCondLst>
+                                            <p:cond delay="0"/>
+                                          </p:stCondLst>
+                                        </p:cTn>
+                                        <p:tgtEl>
+                                          <p:spTgt spid="7">
+                                            <p:txEl>
+                                              <p:pRg st="0" end="0"/>
+                                            </p:txEl>
+                                          </p:spTgt>
+                                        </p:tgtEl>
+                                        <p:attrNameLst>
+                                          <p:attrName>style.visibility</p:attrName>
+                                        </p:attrNameLst>
+                                      </p:cBhvr>
+                                      <p:to>
+                                        <p:strVal val="visible"/>
+                                      </p:to>
+                                    </p:set>
+                                  </p:childTnLst>
+                                </p:cTn>
+                              </p:par>
+                              <p:par>
+                                <p:cTn id="7" presetID="1" presetClass="entr" presetSubtype="0" fill="hold" grpId="0" nodeType="withEffect">
+                                  <p:stCondLst>
+                                    <p:cond delay="0"/>
+                                  </p:stCondLst>
+                                  <p:childTnLst>
+                                    <p:set>
+                                      <p:cBhvr>
+                                        <p:cTn id="8" dur="1" fill="hold">
+                                          <p:stCondLst>
+                                            <p:cond delay="0"/>
+                                          </p:stCondLst>
+                                        </p:cTn>
+                                        <p:tgtEl>
+                                          <p:spTgt spid="7">
+                                            <p:txEl>
+                                              <p:pRg st="1" end="1"/>
+                                            </p:txEl>
+                                          </p:spTgt>
+                                        </p:tgtEl>
+                                        <p:attrNameLst>
+                                          <p:attrName>style.visibility</p:attrName>
+                                        </p:attrNameLst>
+                                      </p:cBhvr>
+                                      <p:to>
+                                        <p:strVal val="visible"/>
+                                      </p:to>
+                                    </p:set>
+                                  </p:childTnLst>
+                                </p:cTn>
+                              </p:par>
+                              <p:par>
+                                <p:cTn id="9" presetID="1" presetClass="entr" presetSubtype="0" fill="hold" grpId="0" nodeType="withEffect">
+                                  <p:stCondLst>
+                                    <p:cond delay="0"/>
+                                  </p:stCondLst>
+                                  <p:childTnLst>
+                                    <p:set>
+                                      <p:cBhvr>
+                                        <p:cTn id="10" dur="1" fill="hold">
+                                          <p:stCondLst>
+                                            <p:cond delay="0"/>
+                                          </p:stCondLst>
+                                        </p:cTn>
+                                        <p:tgtEl>
+                                          <p:spTgt spid="7">
+                                            <p:txEl>
+                                              <p:pRg st="2" end="2"/>
+                                            </p:txEl>
+                                          </p:spTgt>
+                                        </p:tgtEl>
+                                        <p:attrNameLst>
+                                          <p:attrName>style.visibility</p:attrName>
+                                        </p:attrNameLst>
+                                      </p:cBhvr>
+                                      <p:to>
+                                        <p:strVal val="visible"/>
+                                      </p:to>
+                                    </p:set>
+                                  </p:childTnLst>
+                                </p:cTn>
+                              </p:par>
+                            </p:childTnLst>
+                          </p:cTn>
+                        </p:par>
+                      </p:childTnLst>
+                    </p:cTn>
+                  </p:par>
+                  <p:par>
+                    <p:cTn id="11" fill="hold">
+                      <p:stCondLst>
+                        <p:cond delay="indefinite"/>
+                      </p:stCondLst>
+                      <p:childTnLst>
+                        <p:par>
+                          <p:cTn id="12" fill="hold">
+                            <p:stCondLst>
+                              <p:cond delay="0"/>
+                            </p:stCondLst>
+                            <p:childTnLst>
+                              <p:par>
+                                <p:cTn id="13" presetID="1" presetClass="entr" presetSubtype="0" fill="hold" grpId="0" nodeType="clickEffect">
+                                  <p:stCondLst>
+                                    <p:cond delay="0"/>
+                                  </p:stCondLst>
+                                  <p:childTnLst>
+                                    <p:set>
+                                      <p:cBhvr>
+                                        <p:cTn id="14" dur="1" fill="hold">
+                                          <p:stCondLst>
+                                            <p:cond delay="0"/>
+                                          </p:stCondLst>
+                                        </p:cTn>
+                                        <p:tgtEl>
+                                          <p:spTgt spid="7">
+                                            <p:txEl>
+                                              <p:pRg st="3" end="3"/>
+                                            </p:txEl>
+                                          </p:spTgt>
+                                        </p:tgtEl>
+                                        <p:attrNameLst>
+                                          <p:attrName>style.visibility</p:attrName>
+                                        </p:attrNameLst>
+                                      </p:cBhvr>
+                                      <p:to>
+                                        <p:strVal val="visible"/>
+                                      </p:to>
+                                    </p:set>
+                                  </p:childTnLst>
+                                </p:cTn>
+                              </p:par>
+                            </p:childTnLst>
+                          </p:cTn>
+                        </p:par>
+                      </p:childTnLst>
+                    </p:cTn>
+                  </p:par>
+                </p:childTnLst>
+              </p:cTn>
+              <p:prevCondLst>
+                <p:cond evt="onPrev" delay="0">
+                  <p:tgtEl>
+                    <p:sldTgt/>
+                  </p:tgtEl>
+                </p:cond>
+              </p:prevCondLst>
+              <p:nextCondLst>
+                <p:cond evt="onNext" delay="0">
+                  <p:tgtEl>
+                    <p:sldTgt/>
+                  </p:tgtEl>
+                </p:cond>
+              </p:nextCondLst>
+            </p:seq>
+          </p:childTnLst>
+        </p:cTn>
+      </p:par>
+    </p:tnLst>
+    <p:bldLst>
+      <p:bldP spid="7" grpId="0" build="p"/>
+    </p:bldLst>
+  </p:timing>
+</p:sld>
+</file>
+
+<file path=ppt/slides/slide5.xml><?xml version="1.0" encoding="utf-8"?>
+<p:sld xmlns:a="http://schemas.openxmlformats.org/drawingml/2006/main" xmlns:r="http://schemas.openxmlformats.org/officeDocument/2006/relationships" xmlns:p="http://schemas.openxmlformats.org/presentationml/2006/main">
+  <p:cSld>
+    <p:spTree>
+      <p:nvGrpSpPr>
+        <p:cNvPr id="1" name=""/>
+        <p:cNvGrpSpPr/>
+        <p:nvPr/>
+      </p:nvGrpSpPr>
+      <p:grpSpPr>
+        <a:xfrm>
+          <a:off x="0" y="0"/>
+          <a:ext cx="0" cy="0"/>
+          <a:chOff x="0" y="0"/>
+          <a:chExt cx="0" cy="0"/>
+        </a:xfrm>
+      </p:grpSpPr>
+      <p:sp>
+        <p:nvSpPr>
+          <p:cNvPr id="6" name="Date Placeholder 5"/>
+          <p:cNvSpPr>
+            <a:spLocks noGrp="1"/>
+          </p:cNvSpPr>
+          <p:nvPr>
+            <p:ph type="dt" sz="half" idx="10"/>
+          </p:nvPr>
+        </p:nvSpPr>
+        <p:spPr/>
+        <p:txBody>
+          <a:bodyPr/>
+          <a:lstStyle/>
+          <a:p>
+            <a:r>
+              <a:rPr lang="en-US" dirty="0"/>
+              <a:t>10/17/2020</a:t>
+            </a:r>
+          </a:p>
+        </p:txBody>
+      </p:sp>
+      <p:sp>
+        <p:nvSpPr>
+          <p:cNvPr id="5" name="Slide Number Placeholder 4"/>
+          <p:cNvSpPr>
+            <a:spLocks noGrp="1"/>
+          </p:cNvSpPr>
+          <p:nvPr>
+            <p:ph type="sldNum" sz="quarter" idx="12"/>
+          </p:nvPr>
+        </p:nvSpPr>
+        <p:spPr/>
+        <p:txBody>
+          <a:bodyPr/>
+          <a:lstStyle/>
+          <a:p>
+            <a:fld id="{079BB85F-8D7B-4121-93BF-56CC81854BC2}" type="slidenum">
+              <a:rPr lang="en-US" smtClean="0"/>
+              <a:pPr/>
+              <a:t>5</a:t>
+            </a:fld>
+            <a:endParaRPr lang="en-US" dirty="0"/>
+          </a:p>
+        </p:txBody>
+      </p:sp>
+      <p:sp>
+        <p:nvSpPr>
+          <p:cNvPr id="2" name="Title 1"/>
+          <p:cNvSpPr>
+            <a:spLocks noGrp="1"/>
+          </p:cNvSpPr>
+          <p:nvPr>
+            <p:ph type="title"/>
+          </p:nvPr>
+        </p:nvSpPr>
+        <p:spPr/>
+        <p:txBody>
+          <a:bodyPr>
+            <a:normAutofit/>
+          </a:bodyPr>
+          <a:lstStyle/>
+          <a:p>
+            <a:r>
+              <a:rPr lang="en-US" dirty="0"/>
+              <a:t>JSON Parser Update</a:t>
+            </a:r>
+          </a:p>
+        </p:txBody>
+      </p:sp>
+      <p:sp>
+        <p:nvSpPr>
+          <p:cNvPr id="7" name="Text Placeholder 2">
+            <a:extLst>
+              <a:ext uri="{FF2B5EF4-FFF2-40B4-BE49-F238E27FC236}">
+                <a16:creationId xmlns:a16="http://schemas.microsoft.com/office/drawing/2014/main" id="{9E343329-7695-F744-8EB8-2C6B82FEA7AD}"/>
+              </a:ext>
+            </a:extLst>
+          </p:cNvPr>
+          <p:cNvSpPr>
+            <a:spLocks noGrp="1"/>
+          </p:cNvSpPr>
+          <p:nvPr>
+            <p:ph idx="1"/>
+          </p:nvPr>
+        </p:nvSpPr>
+        <p:spPr>
+          <a:xfrm>
+            <a:off x="285750" y="1215483"/>
+            <a:ext cx="8572500" cy="4596355"/>
+          </a:xfrm>
+        </p:spPr>
+        <p:txBody>
+          <a:bodyPr/>
+          <a:lstStyle/>
+          <a:p>
+            <a:r>
+              <a:rPr lang="en-US" dirty="0"/>
+              <a:t>NDJSON can be handled using </a:t>
+            </a:r>
+            <a:r>
+              <a:rPr lang="en-US" dirty="0" err="1"/>
+              <a:t>ndjson</a:t>
+            </a:r>
+            <a:r>
+              <a:rPr lang="en-US" dirty="0"/>
+              <a:t> Python library</a:t>
+            </a:r>
+          </a:p>
+          <a:p>
+            <a:r>
+              <a:rPr lang="en-US" dirty="0"/>
+              <a:t>Note: no other progress on this since we had previously successfully parsed JSON and used </a:t>
+            </a:r>
+            <a:r>
+              <a:rPr lang="en-US" dirty="0" err="1"/>
+              <a:t>fhirclient.py</a:t>
+            </a:r>
+            <a:r>
+              <a:rPr lang="en-US" dirty="0"/>
+              <a:t> to POST to FHIR server</a:t>
+            </a:r>
+          </a:p>
+          <a:p>
+            <a:endParaRPr lang="en-US" dirty="0"/>
+          </a:p>
+        </p:txBody>
+      </p:sp>
+    </p:spTree>
+    <p:extLst>
+      <p:ext uri="{BB962C8B-B14F-4D97-AF65-F5344CB8AC3E}">
+        <p14:creationId xmlns:p14="http://schemas.microsoft.com/office/powerpoint/2010/main" val="3454947322"/>
       </p:ext>
     </p:extLst>
   </p:cSld>
@@ -6200,425 +6744,6 @@
                                   </p:childTnLst>
                                 </p:cTn>
                               </p:par>
-                              <p:par>
-                                <p:cTn id="11" presetID="1" presetClass="entr" presetSubtype="0" fill="hold" grpId="0" nodeType="withEffect">
-                                  <p:stCondLst>
-                                    <p:cond delay="0"/>
-                                  </p:stCondLst>
-                                  <p:childTnLst>
-                                    <p:set>
-                                      <p:cBhvr>
-                                        <p:cTn id="12" dur="1" fill="hold">
-                                          <p:stCondLst>
-                                            <p:cond delay="0"/>
-                                          </p:stCondLst>
-                                        </p:cTn>
-                                        <p:tgtEl>
-                                          <p:spTgt spid="7">
-                                            <p:txEl>
-                                              <p:pRg st="2" end="2"/>
-                                            </p:txEl>
-                                          </p:spTgt>
-                                        </p:tgtEl>
-                                        <p:attrNameLst>
-                                          <p:attrName>style.visibility</p:attrName>
-                                        </p:attrNameLst>
-                                      </p:cBhvr>
-                                      <p:to>
-                                        <p:strVal val="visible"/>
-                                      </p:to>
-                                    </p:set>
-                                  </p:childTnLst>
-                                </p:cTn>
-                              </p:par>
-                              <p:par>
-                                <p:cTn id="13" presetID="1" presetClass="entr" presetSubtype="0" fill="hold" grpId="0" nodeType="withEffect">
-                                  <p:stCondLst>
-                                    <p:cond delay="0"/>
-                                  </p:stCondLst>
-                                  <p:childTnLst>
-                                    <p:set>
-                                      <p:cBhvr>
-                                        <p:cTn id="14" dur="1" fill="hold">
-                                          <p:stCondLst>
-                                            <p:cond delay="0"/>
-                                          </p:stCondLst>
-                                        </p:cTn>
-                                        <p:tgtEl>
-                                          <p:spTgt spid="7">
-                                            <p:txEl>
-                                              <p:pRg st="3" end="3"/>
-                                            </p:txEl>
-                                          </p:spTgt>
-                                        </p:tgtEl>
-                                        <p:attrNameLst>
-                                          <p:attrName>style.visibility</p:attrName>
-                                        </p:attrNameLst>
-                                      </p:cBhvr>
-                                      <p:to>
-                                        <p:strVal val="visible"/>
-                                      </p:to>
-                                    </p:set>
-                                  </p:childTnLst>
-                                </p:cTn>
-                              </p:par>
-                              <p:par>
-                                <p:cTn id="15" presetID="1" presetClass="entr" presetSubtype="0" fill="hold" grpId="0" nodeType="withEffect">
-                                  <p:stCondLst>
-                                    <p:cond delay="0"/>
-                                  </p:stCondLst>
-                                  <p:childTnLst>
-                                    <p:set>
-                                      <p:cBhvr>
-                                        <p:cTn id="16" dur="1" fill="hold">
-                                          <p:stCondLst>
-                                            <p:cond delay="0"/>
-                                          </p:stCondLst>
-                                        </p:cTn>
-                                        <p:tgtEl>
-                                          <p:spTgt spid="7">
-                                            <p:txEl>
-                                              <p:pRg st="4" end="4"/>
-                                            </p:txEl>
-                                          </p:spTgt>
-                                        </p:tgtEl>
-                                        <p:attrNameLst>
-                                          <p:attrName>style.visibility</p:attrName>
-                                        </p:attrNameLst>
-                                      </p:cBhvr>
-                                      <p:to>
-                                        <p:strVal val="visible"/>
-                                      </p:to>
-                                    </p:set>
-                                  </p:childTnLst>
-                                </p:cTn>
-                              </p:par>
-                            </p:childTnLst>
-                          </p:cTn>
-                        </p:par>
-                      </p:childTnLst>
-                    </p:cTn>
-                  </p:par>
-                  <p:par>
-                    <p:cTn id="17" fill="hold">
-                      <p:stCondLst>
-                        <p:cond delay="indefinite"/>
-                      </p:stCondLst>
-                      <p:childTnLst>
-                        <p:par>
-                          <p:cTn id="18" fill="hold">
-                            <p:stCondLst>
-                              <p:cond delay="0"/>
-                            </p:stCondLst>
-                            <p:childTnLst>
-                              <p:par>
-                                <p:cTn id="19" presetID="1" presetClass="entr" presetSubtype="0" fill="hold" grpId="0" nodeType="clickEffect">
-                                  <p:stCondLst>
-                                    <p:cond delay="0"/>
-                                  </p:stCondLst>
-                                  <p:childTnLst>
-                                    <p:set>
-                                      <p:cBhvr>
-                                        <p:cTn id="20" dur="1" fill="hold">
-                                          <p:stCondLst>
-                                            <p:cond delay="0"/>
-                                          </p:stCondLst>
-                                        </p:cTn>
-                                        <p:tgtEl>
-                                          <p:spTgt spid="7">
-                                            <p:txEl>
-                                              <p:pRg st="5" end="5"/>
-                                            </p:txEl>
-                                          </p:spTgt>
-                                        </p:tgtEl>
-                                        <p:attrNameLst>
-                                          <p:attrName>style.visibility</p:attrName>
-                                        </p:attrNameLst>
-                                      </p:cBhvr>
-                                      <p:to>
-                                        <p:strVal val="visible"/>
-                                      </p:to>
-                                    </p:set>
-                                  </p:childTnLst>
-                                </p:cTn>
-                              </p:par>
-                              <p:par>
-                                <p:cTn id="21" presetID="1" presetClass="entr" presetSubtype="0" fill="hold" grpId="0" nodeType="withEffect">
-                                  <p:stCondLst>
-                                    <p:cond delay="0"/>
-                                  </p:stCondLst>
-                                  <p:childTnLst>
-                                    <p:set>
-                                      <p:cBhvr>
-                                        <p:cTn id="22" dur="1" fill="hold">
-                                          <p:stCondLst>
-                                            <p:cond delay="0"/>
-                                          </p:stCondLst>
-                                        </p:cTn>
-                                        <p:tgtEl>
-                                          <p:spTgt spid="7">
-                                            <p:txEl>
-                                              <p:pRg st="6" end="6"/>
-                                            </p:txEl>
-                                          </p:spTgt>
-                                        </p:tgtEl>
-                                        <p:attrNameLst>
-                                          <p:attrName>style.visibility</p:attrName>
-                                        </p:attrNameLst>
-                                      </p:cBhvr>
-                                      <p:to>
-                                        <p:strVal val="visible"/>
-                                      </p:to>
-                                    </p:set>
-                                  </p:childTnLst>
-                                </p:cTn>
-                              </p:par>
-                              <p:par>
-                                <p:cTn id="23" presetID="1" presetClass="entr" presetSubtype="0" fill="hold" grpId="0" nodeType="withEffect">
-                                  <p:stCondLst>
-                                    <p:cond delay="0"/>
-                                  </p:stCondLst>
-                                  <p:childTnLst>
-                                    <p:set>
-                                      <p:cBhvr>
-                                        <p:cTn id="24" dur="1" fill="hold">
-                                          <p:stCondLst>
-                                            <p:cond delay="0"/>
-                                          </p:stCondLst>
-                                        </p:cTn>
-                                        <p:tgtEl>
-                                          <p:spTgt spid="7">
-                                            <p:txEl>
-                                              <p:pRg st="7" end="7"/>
-                                            </p:txEl>
-                                          </p:spTgt>
-                                        </p:tgtEl>
-                                        <p:attrNameLst>
-                                          <p:attrName>style.visibility</p:attrName>
-                                        </p:attrNameLst>
-                                      </p:cBhvr>
-                                      <p:to>
-                                        <p:strVal val="visible"/>
-                                      </p:to>
-                                    </p:set>
-                                  </p:childTnLst>
-                                </p:cTn>
-                              </p:par>
-                            </p:childTnLst>
-                          </p:cTn>
-                        </p:par>
-                      </p:childTnLst>
-                    </p:cTn>
-                  </p:par>
-                </p:childTnLst>
-              </p:cTn>
-              <p:prevCondLst>
-                <p:cond evt="onPrev" delay="0">
-                  <p:tgtEl>
-                    <p:sldTgt/>
-                  </p:tgtEl>
-                </p:cond>
-              </p:prevCondLst>
-              <p:nextCondLst>
-                <p:cond evt="onNext" delay="0">
-                  <p:tgtEl>
-                    <p:sldTgt/>
-                  </p:tgtEl>
-                </p:cond>
-              </p:nextCondLst>
-            </p:seq>
-          </p:childTnLst>
-        </p:cTn>
-      </p:par>
-    </p:tnLst>
-    <p:bldLst>
-      <p:bldP spid="7" grpId="0" build="p"/>
-    </p:bldLst>
-  </p:timing>
-</p:sld>
-</file>
-
-<file path=ppt/slides/slide5.xml><?xml version="1.0" encoding="utf-8"?>
-<p:sld xmlns:a="http://schemas.openxmlformats.org/drawingml/2006/main" xmlns:r="http://schemas.openxmlformats.org/officeDocument/2006/relationships" xmlns:p="http://schemas.openxmlformats.org/presentationml/2006/main">
-  <p:cSld>
-    <p:spTree>
-      <p:nvGrpSpPr>
-        <p:cNvPr id="1" name=""/>
-        <p:cNvGrpSpPr/>
-        <p:nvPr/>
-      </p:nvGrpSpPr>
-      <p:grpSpPr>
-        <a:xfrm>
-          <a:off x="0" y="0"/>
-          <a:ext cx="0" cy="0"/>
-          <a:chOff x="0" y="0"/>
-          <a:chExt cx="0" cy="0"/>
-        </a:xfrm>
-      </p:grpSpPr>
-      <p:sp>
-        <p:nvSpPr>
-          <p:cNvPr id="6" name="Date Placeholder 5"/>
-          <p:cNvSpPr>
-            <a:spLocks noGrp="1"/>
-          </p:cNvSpPr>
-          <p:nvPr>
-            <p:ph type="dt" sz="half" idx="10"/>
-          </p:nvPr>
-        </p:nvSpPr>
-        <p:spPr/>
-        <p:txBody>
-          <a:bodyPr/>
-          <a:lstStyle/>
-          <a:p>
-            <a:r>
-              <a:rPr lang="en-US" dirty="0"/>
-              <a:t>10/17/2020</a:t>
-            </a:r>
-          </a:p>
-        </p:txBody>
-      </p:sp>
-      <p:sp>
-        <p:nvSpPr>
-          <p:cNvPr id="5" name="Slide Number Placeholder 4"/>
-          <p:cNvSpPr>
-            <a:spLocks noGrp="1"/>
-          </p:cNvSpPr>
-          <p:nvPr>
-            <p:ph type="sldNum" sz="quarter" idx="12"/>
-          </p:nvPr>
-        </p:nvSpPr>
-        <p:spPr/>
-        <p:txBody>
-          <a:bodyPr/>
-          <a:lstStyle/>
-          <a:p>
-            <a:fld id="{079BB85F-8D7B-4121-93BF-56CC81854BC2}" type="slidenum">
-              <a:rPr lang="en-US" smtClean="0"/>
-              <a:pPr/>
-              <a:t>5</a:t>
-            </a:fld>
-            <a:endParaRPr lang="en-US" dirty="0"/>
-          </a:p>
-        </p:txBody>
-      </p:sp>
-      <p:sp>
-        <p:nvSpPr>
-          <p:cNvPr id="2" name="Title 1"/>
-          <p:cNvSpPr>
-            <a:spLocks noGrp="1"/>
-          </p:cNvSpPr>
-          <p:nvPr>
-            <p:ph type="title"/>
-          </p:nvPr>
-        </p:nvSpPr>
-        <p:spPr/>
-        <p:txBody>
-          <a:bodyPr>
-            <a:normAutofit/>
-          </a:bodyPr>
-          <a:lstStyle/>
-          <a:p>
-            <a:r>
-              <a:rPr lang="en-US" dirty="0"/>
-              <a:t>JSON Parser Update</a:t>
-            </a:r>
-          </a:p>
-        </p:txBody>
-      </p:sp>
-      <p:sp>
-        <p:nvSpPr>
-          <p:cNvPr id="7" name="Text Placeholder 2">
-            <a:extLst>
-              <a:ext uri="{FF2B5EF4-FFF2-40B4-BE49-F238E27FC236}">
-                <a16:creationId xmlns:a16="http://schemas.microsoft.com/office/drawing/2014/main" id="{9E343329-7695-F744-8EB8-2C6B82FEA7AD}"/>
-              </a:ext>
-            </a:extLst>
-          </p:cNvPr>
-          <p:cNvSpPr>
-            <a:spLocks noGrp="1"/>
-          </p:cNvSpPr>
-          <p:nvPr>
-            <p:ph idx="1"/>
-          </p:nvPr>
-        </p:nvSpPr>
-        <p:spPr>
-          <a:xfrm>
-            <a:off x="285750" y="1215483"/>
-            <a:ext cx="8572500" cy="4596355"/>
-          </a:xfrm>
-        </p:spPr>
-        <p:txBody>
-          <a:bodyPr/>
-          <a:lstStyle/>
-          <a:p>
-            <a:r>
-              <a:rPr lang="en-US" dirty="0"/>
-              <a:t>TBD</a:t>
-            </a:r>
-          </a:p>
-        </p:txBody>
-      </p:sp>
-    </p:spTree>
-    <p:extLst>
-      <p:ext uri="{BB962C8B-B14F-4D97-AF65-F5344CB8AC3E}">
-        <p14:creationId xmlns:p14="http://schemas.microsoft.com/office/powerpoint/2010/main" val="3454947322"/>
-      </p:ext>
-    </p:extLst>
-  </p:cSld>
-  <p:clrMapOvr>
-    <a:masterClrMapping/>
-  </p:clrMapOvr>
-  <p:timing>
-    <p:tnLst>
-      <p:par>
-        <p:cTn id="1" dur="indefinite" restart="never" nodeType="tmRoot">
-          <p:childTnLst>
-            <p:seq concurrent="1" nextAc="seek">
-              <p:cTn id="2" dur="indefinite" nodeType="mainSeq">
-                <p:childTnLst>
-                  <p:par>
-                    <p:cTn id="3" fill="hold">
-                      <p:stCondLst>
-                        <p:cond delay="indefinite"/>
-                      </p:stCondLst>
-                      <p:childTnLst>
-                        <p:par>
-                          <p:cTn id="4" fill="hold">
-                            <p:stCondLst>
-                              <p:cond delay="0"/>
-                            </p:stCondLst>
-                            <p:childTnLst>
-                              <p:par>
-                                <p:cTn id="5" presetID="1" presetClass="entr" presetSubtype="0" fill="hold" grpId="0" nodeType="clickEffect">
-                                  <p:stCondLst>
-                                    <p:cond delay="0"/>
-                                  </p:stCondLst>
-                                  <p:childTnLst>
-                                    <p:set>
-                                      <p:cBhvr>
-                                        <p:cTn id="6" dur="1" fill="hold">
-                                          <p:stCondLst>
-                                            <p:cond delay="0"/>
-                                          </p:stCondLst>
-                                        </p:cTn>
-                                        <p:tgtEl>
-                                          <p:spTgt spid="7">
-                                            <p:txEl>
-                                              <p:pRg st="0" end="0"/>
-                                            </p:txEl>
-                                          </p:spTgt>
-                                        </p:tgtEl>
-                                        <p:attrNameLst>
-                                          <p:attrName>style.visibility</p:attrName>
-                                        </p:attrNameLst>
-                                      </p:cBhvr>
-                                      <p:to>
-                                        <p:strVal val="visible"/>
-                                      </p:to>
-                                    </p:set>
-                                  </p:childTnLst>
-                                </p:cTn>
-                              </p:par>
                             </p:childTnLst>
                           </p:cTn>
                         </p:par>
@@ -6766,8 +6891,25 @@
           <a:p>
             <a:r>
               <a:rPr lang="en-US" dirty="0"/>
-              <a:t>TBD</a:t>
-            </a:r>
+              <a:t>Directly pulled in XML and was able to POST it to FHIR server using an HTTP request</a:t>
+            </a:r>
+          </a:p>
+          <a:p>
+            <a:r>
+              <a:rPr lang="en-US" dirty="0"/>
+              <a:t>Was able to POST a bundle of patient resources to server</a:t>
+            </a:r>
+          </a:p>
+          <a:p>
+            <a:r>
+              <a:rPr lang="en-US" dirty="0"/>
+              <a:t>Debugging spurious characters in the XML response after conversion to a Python dictionary using library </a:t>
+            </a:r>
+            <a:r>
+              <a:rPr lang="en-US" dirty="0" err="1"/>
+              <a:t>xmltodict</a:t>
+            </a:r>
+            <a:endParaRPr lang="en-US" dirty="0"/>
           </a:p>
         </p:txBody>
       </p:sp>
@@ -6838,6 +6980,104 @@
                       </p:childTnLst>
                     </p:cTn>
                   </p:par>
+                  <p:par>
+                    <p:cTn id="7" fill="hold">
+                      <p:stCondLst>
+                        <p:cond delay="indefinite"/>
+                      </p:stCondLst>
+                      <p:childTnLst>
+                        <p:par>
+                          <p:cTn id="8" fill="hold">
+                            <p:stCondLst>
+                              <p:cond delay="0"/>
+                            </p:stCondLst>
+                            <p:childTnLst>
+                              <p:par>
+                                <p:cTn id="9" presetID="1" presetClass="entr" presetSubtype="0" fill="hold" grpId="0" nodeType="clickEffect">
+                                  <p:stCondLst>
+                                    <p:cond delay="0"/>
+                                  </p:stCondLst>
+                                  <p:childTnLst>
+                                    <p:set>
+                                      <p:cBhvr>
+                                        <p:cTn id="10" dur="1" fill="hold">
+                                          <p:stCondLst>
+                                            <p:cond delay="0"/>
+                                          </p:stCondLst>
+                                        </p:cTn>
+                                        <p:tgtEl>
+                                          <p:spTgt spid="7">
+                                            <p:txEl>
+                                              <p:pRg st="1" end="1"/>
+                                            </p:txEl>
+                                          </p:spTgt>
+                                        </p:tgtEl>
+                                        <p:attrNameLst>
+                                          <p:attrName>style.visibility</p:attrName>
+                                        </p:attrNameLst>
+                                      </p:cBhvr>
+                                      <p:to>
+                                        <p:strVal val="visible"/>
+                                      </p:to>
+                                    </p:set>
+                                  </p:childTnLst>
+                                </p:cTn>
+                              </p:par>
+                            </p:childTnLst>
+                          </p:cTn>
+                        </p:par>
+                      </p:childTnLst>
+                    </p:cTn>
+                  </p:par>
+                  <p:par>
+                    <p:cTn id="11" fill="hold">
+                      <p:stCondLst>
+                        <p:cond delay="indefinite"/>
+                      </p:stCondLst>
+                      <p:childTnLst>
+                        <p:par>
+                          <p:cTn id="12" fill="hold">
+                            <p:stCondLst>
+                              <p:cond delay="0"/>
+                            </p:stCondLst>
+                            <p:childTnLst>
+                              <p:par>
+                                <p:cTn id="13" presetID="1" presetClass="entr" presetSubtype="0" fill="hold" grpId="0" nodeType="clickEffect">
+                                  <p:stCondLst>
+                                    <p:cond delay="0"/>
+                                  </p:stCondLst>
+                                  <p:childTnLst>
+                                    <p:set>
+                                      <p:cBhvr>
+                                        <p:cTn id="14" dur="1" fill="hold">
+                                          <p:stCondLst>
+                                            <p:cond delay="0"/>
+                                          </p:stCondLst>
+                                        </p:cTn>
+                                        <p:tgtEl>
+                                          <p:spTgt spid="7">
+                                            <p:txEl>
+                                              <p:pRg st="2" end="2"/>
+                                            </p:txEl>
+                                          </p:spTgt>
+                                        </p:tgtEl>
+                                        <p:attrNameLst>
+                                          <p:attrName>style.visibility</p:attrName>
+                                        </p:attrNameLst>
+                                      </p:cBhvr>
+                                      <p:to>
+                                        <p:strVal val="visible"/>
+                                      </p:to>
+                                    </p:set>
+                                  </p:childTnLst>
+                                </p:cTn>
+                              </p:par>
+                            </p:childTnLst>
+                          </p:cTn>
+                        </p:par>
+                      </p:childTnLst>
+                    </p:cTn>
+                  </p:par>
                 </p:childTnLst>
               </p:cTn>
               <p:prevCondLst>
@@ -6979,7 +7219,7 @@
           <a:p>
             <a:r>
               <a:rPr lang="en-US" dirty="0"/>
-              <a:t>TBD</a:t>
+              <a:t>This is no longer a separate task; it has been integrated into the JSON and XML Parser sections since these will do an HTTP request on their own</a:t>
             </a:r>
           </a:p>
         </p:txBody>
@@ -7194,8 +7434,17 @@
           <a:p>
             <a:r>
               <a:rPr lang="en-US" dirty="0"/>
-              <a:t>TBD</a:t>
-            </a:r>
+              <a:t>GUI up and running, able to view table created</a:t>
+            </a:r>
+          </a:p>
+          <a:p>
+            <a:r>
+              <a:rPr lang="en-US" dirty="0"/>
+              <a:t>Worked through Docker settings issue causing an issue when trying to run the database create script</a:t>
+            </a:r>
+          </a:p>
+          <a:p>
+            <a:endParaRPr lang="en-US" dirty="0"/>
           </a:p>
         </p:txBody>
       </p:sp>
@@ -7266,6 +7515,55 @@
                       </p:childTnLst>
                     </p:cTn>
                   </p:par>
+                  <p:par>
+                    <p:cTn id="7" fill="hold">
+                      <p:stCondLst>
+                        <p:cond delay="indefinite"/>
+                      </p:stCondLst>
+                      <p:childTnLst>
+                        <p:par>
+                          <p:cTn id="8" fill="hold">
+                            <p:stCondLst>
+                              <p:cond delay="0"/>
+                            </p:stCondLst>
+                            <p:childTnLst>
+                              <p:par>
+                                <p:cTn id="9" presetID="1" presetClass="entr" presetSubtype="0" fill="hold" grpId="0" nodeType="clickEffect">
+                                  <p:stCondLst>
+                                    <p:cond delay="0"/>
+                                  </p:stCondLst>
+                                  <p:childTnLst>
+                                    <p:set>
+                                      <p:cBhvr>
+                                        <p:cTn id="10" dur="1" fill="hold">
+                                          <p:stCondLst>
+                                            <p:cond delay="0"/>
+                                          </p:stCondLst>
+                                        </p:cTn>
+                                        <p:tgtEl>
+                                          <p:spTgt spid="8">
+                                            <p:txEl>
+                                              <p:pRg st="1" end="1"/>
+                                            </p:txEl>
+                                          </p:spTgt>
+                                        </p:tgtEl>
+                                        <p:attrNameLst>
+                                          <p:attrName>style.visibility</p:attrName>
+                                        </p:attrNameLst>
+                                      </p:cBhvr>
+                                      <p:to>
+                                        <p:strVal val="visible"/>
+                                      </p:to>
+                                    </p:set>
+                                  </p:childTnLst>
+                                </p:cTn>
+                              </p:par>
+                            </p:childTnLst>
+                          </p:cTn>
+                        </p:par>
+                      </p:childTnLst>
+                    </p:cTn>
+                  </p:par>
                 </p:childTnLst>
               </p:cTn>
               <p:prevCondLst>
@@ -7415,8 +7713,19 @@
           <a:p>
             <a:r>
               <a:rPr lang="en-US" dirty="0"/>
-              <a:t>TBD</a:t>
-            </a:r>
+              <a:t>Validated that </a:t>
+            </a:r>
+            <a:r>
+              <a:rPr lang="en-US" dirty="0" err="1"/>
+              <a:t>Dockerfile</a:t>
+            </a:r>
+            <a:r>
+              <a:rPr lang="en-US" dirty="0"/>
+              <a:t> was able to stand up the DB and access it using the GUI</a:t>
+            </a:r>
+          </a:p>
+          <a:p>
+            <a:endParaRPr lang="en-US" dirty="0"/>
           </a:p>
         </p:txBody>
       </p:sp>

</xml_diff>